<commit_message>
Updated instructions and slides for rec3
</commit_message>
<xml_diff>
--- a/resources/recitations/2021/Recitation 3/Rec3_ React.pptx
+++ b/resources/recitations/2021/Recitation 3/Rec3_ React.pptx
@@ -17,21 +17,22 @@
     <p:sldId id="262" r:id="rId12"/>
     <p:sldId id="263" r:id="rId13"/>
     <p:sldId id="264" r:id="rId14"/>
+    <p:sldId id="265" r:id="rId15"/>
   </p:sldIdLst>
   <p:sldSz cy="5143500" cx="9144000"/>
   <p:notesSz cx="6858000" cy="9144000"/>
   <p:embeddedFontLst>
     <p:embeddedFont>
       <p:font typeface="Roboto Slab"/>
-      <p:regular r:id="rId15"/>
-      <p:bold r:id="rId16"/>
+      <p:regular r:id="rId16"/>
+      <p:bold r:id="rId17"/>
     </p:embeddedFont>
     <p:embeddedFont>
       <p:font typeface="Roboto"/>
-      <p:regular r:id="rId17"/>
-      <p:bold r:id="rId18"/>
-      <p:italic r:id="rId19"/>
-      <p:boldItalic r:id="rId20"/>
+      <p:regular r:id="rId18"/>
+      <p:bold r:id="rId19"/>
+      <p:italic r:id="rId20"/>
+      <p:boldItalic r:id="rId21"/>
     </p:embeddedFont>
   </p:embeddedFontLst>
   <p:defaultTextStyle>
@@ -807,6 +808,105 @@
 </p:notes>
 </file>
 
+<file path=ppt/notesSlides/notesSlide10.xml><?xml version="1.0" encoding="utf-8"?>
+<p:notes xmlns:a="http://schemas.openxmlformats.org/drawingml/2006/main" xmlns:r="http://schemas.openxmlformats.org/officeDocument/2006/relationships" xmlns:mc="http://schemas.openxmlformats.org/markup-compatibility/2006" xmlns:mv="urn:schemas-microsoft-com:mac:vml" xmlns:p="http://schemas.openxmlformats.org/presentationml/2006/main" xmlns:c="http://schemas.openxmlformats.org/drawingml/2006/chart" xmlns:dgm="http://schemas.openxmlformats.org/drawingml/2006/diagram" xmlns:o="urn:schemas-microsoft-com:office:office" xmlns:v="urn:schemas-microsoft-com:vml" xmlns:pvml="urn:schemas-microsoft-com:office:powerpoint" xmlns:com="http://schemas.openxmlformats.org/drawingml/2006/compatibility" xmlns:p14="http://schemas.microsoft.com/office/powerpoint/2010/main" xmlns:p15="http://schemas.microsoft.com/office/powerpoint/2012/main" xmlns:ahyp="http://schemas.microsoft.com/office/drawing/2018/hyperlinkcolor" showMasterPhAnim="0" showMasterSp="0">
+  <p:cSld>
+    <p:spTree>
+      <p:nvGrpSpPr>
+        <p:cNvPr id="117" name="Shape 117"/>
+        <p:cNvGrpSpPr/>
+        <p:nvPr/>
+      </p:nvGrpSpPr>
+      <p:grpSpPr>
+        <a:xfrm>
+          <a:off x="0" y="0"/>
+          <a:ext cx="0" cy="0"/>
+          <a:chOff x="0" y="0"/>
+          <a:chExt cx="0" cy="0"/>
+        </a:xfrm>
+      </p:grpSpPr>
+      <p:sp>
+        <p:nvSpPr>
+          <p:cNvPr id="118" name="Google Shape;118;gbcea66500f_0_154:notes"/>
+          <p:cNvSpPr/>
+          <p:nvPr>
+            <p:ph idx="2" type="sldImg"/>
+          </p:nvPr>
+        </p:nvSpPr>
+        <p:spPr>
+          <a:xfrm>
+            <a:off x="381300" y="685800"/>
+            <a:ext cx="6096000" cy="3429000"/>
+          </a:xfrm>
+          <a:custGeom>
+            <a:rect b="b" l="l" r="r" t="t"/>
+            <a:pathLst>
+              <a:path extrusionOk="0" h="120000" w="120000">
+                <a:moveTo>
+                  <a:pt x="0" y="0"/>
+                </a:moveTo>
+                <a:lnTo>
+                  <a:pt x="120000" y="0"/>
+                </a:lnTo>
+                <a:lnTo>
+                  <a:pt x="120000" y="120000"/>
+                </a:lnTo>
+                <a:lnTo>
+                  <a:pt x="0" y="120000"/>
+                </a:lnTo>
+                <a:close/>
+              </a:path>
+            </a:pathLst>
+          </a:custGeom>
+        </p:spPr>
+      </p:sp>
+      <p:sp>
+        <p:nvSpPr>
+          <p:cNvPr id="119" name="Google Shape;119;gbcea66500f_0_154:notes"/>
+          <p:cNvSpPr txBox="1"/>
+          <p:nvPr>
+            <p:ph idx="1" type="body"/>
+          </p:nvPr>
+        </p:nvSpPr>
+        <p:spPr>
+          <a:xfrm>
+            <a:off x="685800" y="4343400"/>
+            <a:ext cx="5486400" cy="4114800"/>
+          </a:xfrm>
+          <a:prstGeom prst="rect">
+            <a:avLst/>
+          </a:prstGeom>
+        </p:spPr>
+        <p:txBody>
+          <a:bodyPr anchorCtr="0" anchor="t" bIns="91425" lIns="91425" spcFirstLastPara="1" rIns="91425" wrap="square" tIns="91425">
+            <a:noAutofit/>
+          </a:bodyPr>
+          <a:lstStyle/>
+          <a:p>
+            <a:pPr indent="0" lvl="0" marL="0" rtl="0" algn="l">
+              <a:spcBef>
+                <a:spcPts val="0"/>
+              </a:spcBef>
+              <a:spcAft>
+                <a:spcPts val="0"/>
+              </a:spcAft>
+              <a:buNone/>
+            </a:pPr>
+            <a:r>
+              <a:t/>
+            </a:r>
+            <a:endParaRPr/>
+          </a:p>
+        </p:txBody>
+      </p:sp>
+    </p:spTree>
+  </p:cSld>
+  <p:clrMapOvr>
+    <a:masterClrMapping/>
+  </p:clrMapOvr>
+</p:notes>
+</file>
+
 <file path=ppt/notesSlides/notesSlide2.xml><?xml version="1.0" encoding="utf-8"?>
 <p:notes xmlns:a="http://schemas.openxmlformats.org/drawingml/2006/main" xmlns:r="http://schemas.openxmlformats.org/officeDocument/2006/relationships" xmlns:mc="http://schemas.openxmlformats.org/markup-compatibility/2006" xmlns:mv="urn:schemas-microsoft-com:mac:vml" xmlns:p="http://schemas.openxmlformats.org/presentationml/2006/main" xmlns:c="http://schemas.openxmlformats.org/drawingml/2006/chart" xmlns:dgm="http://schemas.openxmlformats.org/drawingml/2006/diagram" xmlns:o="urn:schemas-microsoft-com:office:office" xmlns:v="urn:schemas-microsoft-com:vml" xmlns:pvml="urn:schemas-microsoft-com:office:powerpoint" xmlns:com="http://schemas.openxmlformats.org/drawingml/2006/compatibility" xmlns:p14="http://schemas.microsoft.com/office/powerpoint/2010/main" xmlns:p15="http://schemas.microsoft.com/office/powerpoint/2012/main" xmlns:ahyp="http://schemas.microsoft.com/office/drawing/2018/hyperlinkcolor" showMasterPhAnim="0" showMasterSp="0">
   <p:cSld>
@@ -1024,7 +1124,7 @@
       </p:grpSpPr>
       <p:sp>
         <p:nvSpPr>
-          <p:cNvPr id="79" name="Google Shape;79;gbcea66500f_0_126:notes"/>
+          <p:cNvPr id="79" name="Google Shape;79;gbd49525fdb_0_0:notes"/>
           <p:cNvSpPr/>
           <p:nvPr>
             <p:ph idx="2" type="sldImg"/>
@@ -1059,7 +1159,7 @@
       </p:sp>
       <p:sp>
         <p:nvSpPr>
-          <p:cNvPr id="80" name="Google Shape;80;gbcea66500f_0_126:notes"/>
+          <p:cNvPr id="80" name="Google Shape;80;gbd49525fdb_0_0:notes"/>
           <p:cNvSpPr txBox="1"/>
           <p:nvPr>
             <p:ph idx="1" type="body"/>
@@ -1090,56 +1190,7 @@
               <a:buNone/>
             </a:pPr>
             <a:r>
-              <a:rPr lang="en"/>
-              <a:t>Library: collection of code snippets (Framework is an environment to develop within, built with solutions to common problems)</a:t>
-            </a:r>
-            <a:endParaRPr/>
-          </a:p>
-          <a:p>
-            <a:pPr indent="0" lvl="0" marL="0" rtl="0" algn="l">
-              <a:spcBef>
-                <a:spcPts val="0"/>
-              </a:spcBef>
-              <a:spcAft>
-                <a:spcPts val="0"/>
-              </a:spcAft>
-              <a:buNone/>
-            </a:pPr>
-            <a:r>
-              <a:rPr lang="en"/>
-              <a:t>Declarative: just say what you want to show and it will show</a:t>
-            </a:r>
-            <a:endParaRPr/>
-          </a:p>
-          <a:p>
-            <a:pPr indent="0" lvl="0" marL="0" rtl="0" algn="l">
-              <a:spcBef>
-                <a:spcPts val="0"/>
-              </a:spcBef>
-              <a:spcAft>
-                <a:spcPts val="0"/>
-              </a:spcAft>
-              <a:buNone/>
-            </a:pPr>
-            <a:r>
-              <a:rPr lang="en"/>
-              <a:t>Component Based: this is the way you should think for React (and for some other programming endeavors)</a:t>
-            </a:r>
-            <a:endParaRPr/>
-          </a:p>
-          <a:p>
-            <a:pPr indent="0" lvl="0" marL="0" rtl="0" algn="l">
-              <a:spcBef>
-                <a:spcPts val="0"/>
-              </a:spcBef>
-              <a:spcAft>
-                <a:spcPts val="0"/>
-              </a:spcAft>
-              <a:buNone/>
-            </a:pPr>
-            <a:r>
-              <a:rPr lang="en"/>
-              <a:t>JSX: You can define and pass around HTML elements as if they were JS objects</a:t>
+              <a:t/>
             </a:r>
             <a:endParaRPr/>
           </a:p>
@@ -1158,7 +1209,7 @@
   <p:cSld>
     <p:spTree>
       <p:nvGrpSpPr>
-        <p:cNvPr id="85" name="Shape 85"/>
+        <p:cNvPr id="84" name="Shape 84"/>
         <p:cNvGrpSpPr/>
         <p:nvPr/>
       </p:nvGrpSpPr>
@@ -1172,7 +1223,7 @@
       </p:grpSpPr>
       <p:sp>
         <p:nvSpPr>
-          <p:cNvPr id="86" name="Google Shape;86;gbcea66500f_0_132:notes"/>
+          <p:cNvPr id="85" name="Google Shape;85;gbcea66500f_0_126:notes"/>
           <p:cNvSpPr/>
           <p:nvPr>
             <p:ph idx="2" type="sldImg"/>
@@ -1207,7 +1258,7 @@
       </p:sp>
       <p:sp>
         <p:nvSpPr>
-          <p:cNvPr id="87" name="Google Shape;87;gbcea66500f_0_132:notes"/>
+          <p:cNvPr id="86" name="Google Shape;86;gbcea66500f_0_126:notes"/>
           <p:cNvSpPr txBox="1"/>
           <p:nvPr>
             <p:ph idx="1" type="body"/>
@@ -1239,7 +1290,7 @@
             </a:pPr>
             <a:r>
               <a:rPr lang="en"/>
-              <a:t>React renders with the DOM (Document Object Model)</a:t>
+              <a:t>Library: collection of code snippets (Framework is an environment to develop within, built with solutions to common problems)</a:t>
             </a:r>
             <a:endParaRPr/>
           </a:p>
@@ -1255,7 +1306,7 @@
             </a:pPr>
             <a:r>
               <a:rPr lang="en"/>
-              <a:t>When a component’s state changes, React ONLY reloads that one component (saves time and computation).</a:t>
+              <a:t>Declarative: just say what you want to show and it will show</a:t>
             </a:r>
             <a:endParaRPr/>
           </a:p>
@@ -1271,7 +1322,7 @@
             </a:pPr>
             <a:r>
               <a:rPr lang="en"/>
-              <a:t>Practically, react sees function/class components as the same. Choose whatever works for you.</a:t>
+              <a:t>Component Based: this is the way you should think for React (and for some other programming endeavors)</a:t>
             </a:r>
             <a:endParaRPr/>
           </a:p>
@@ -1287,84 +1338,7 @@
             </a:pPr>
             <a:r>
               <a:rPr lang="en"/>
-              <a:t>NOTE: The Functional approach takes advantage of newer syntax and features such as React Hooks. I would personally choose that route, but both are totally fine.</a:t>
-            </a:r>
-            <a:endParaRPr/>
-          </a:p>
-          <a:p>
-            <a:pPr indent="0" lvl="0" marL="0" rtl="0" algn="l">
-              <a:spcBef>
-                <a:spcPts val="0"/>
-              </a:spcBef>
-              <a:spcAft>
-                <a:spcPts val="0"/>
-              </a:spcAft>
-              <a:buNone/>
-            </a:pPr>
-            <a:r>
-              <a:t/>
-            </a:r>
-            <a:endParaRPr/>
-          </a:p>
-          <a:p>
-            <a:pPr indent="0" lvl="0" marL="0" rtl="0" algn="l">
-              <a:spcBef>
-                <a:spcPts val="0"/>
-              </a:spcBef>
-              <a:spcAft>
-                <a:spcPts val="0"/>
-              </a:spcAft>
-              <a:buNone/>
-            </a:pPr>
-            <a:r>
-              <a:rPr lang="en"/>
-              <a:t>Same props = same rendered component</a:t>
-            </a:r>
-            <a:endParaRPr/>
-          </a:p>
-          <a:p>
-            <a:pPr indent="0" lvl="0" marL="0" rtl="0" algn="l">
-              <a:spcBef>
-                <a:spcPts val="0"/>
-              </a:spcBef>
-              <a:spcAft>
-                <a:spcPts val="0"/>
-              </a:spcAft>
-              <a:buNone/>
-            </a:pPr>
-            <a:r>
-              <a:rPr lang="en"/>
-              <a:t>No side effects, and props are read only.</a:t>
-            </a:r>
-            <a:endParaRPr/>
-          </a:p>
-          <a:p>
-            <a:pPr indent="0" lvl="0" marL="0" rtl="0" algn="l">
-              <a:spcBef>
-                <a:spcPts val="0"/>
-              </a:spcBef>
-              <a:spcAft>
-                <a:spcPts val="0"/>
-              </a:spcAft>
-              <a:buNone/>
-            </a:pPr>
-            <a:r>
-              <a:t/>
-            </a:r>
-            <a:endParaRPr/>
-          </a:p>
-          <a:p>
-            <a:pPr indent="0" lvl="0" marL="0" rtl="0" algn="l">
-              <a:spcBef>
-                <a:spcPts val="0"/>
-              </a:spcBef>
-              <a:spcAft>
-                <a:spcPts val="0"/>
-              </a:spcAft>
-              <a:buNone/>
-            </a:pPr>
-            <a:r>
-              <a:t/>
+              <a:t>JSX: You can define and pass around HTML elements as if they were JS objects</a:t>
             </a:r>
             <a:endParaRPr/>
           </a:p>
@@ -1383,7 +1357,7 @@
   <p:cSld>
     <p:spTree>
       <p:nvGrpSpPr>
-        <p:cNvPr id="93" name="Shape 93"/>
+        <p:cNvPr id="91" name="Shape 91"/>
         <p:cNvGrpSpPr/>
         <p:nvPr/>
       </p:nvGrpSpPr>
@@ -1397,7 +1371,7 @@
       </p:grpSpPr>
       <p:sp>
         <p:nvSpPr>
-          <p:cNvPr id="94" name="Google Shape;94;gbcea66500f_0_139:notes"/>
+          <p:cNvPr id="92" name="Google Shape;92;gbcea66500f_0_132:notes"/>
           <p:cNvSpPr/>
           <p:nvPr>
             <p:ph idx="2" type="sldImg"/>
@@ -1432,7 +1406,7 @@
       </p:sp>
       <p:sp>
         <p:nvSpPr>
-          <p:cNvPr id="95" name="Google Shape;95;gbcea66500f_0_139:notes"/>
+          <p:cNvPr id="93" name="Google Shape;93;gbcea66500f_0_132:notes"/>
           <p:cNvSpPr txBox="1"/>
           <p:nvPr>
             <p:ph idx="1" type="body"/>
@@ -1452,6 +1426,132 @@
             <a:noAutofit/>
           </a:bodyPr>
           <a:lstStyle/>
+          <a:p>
+            <a:pPr indent="0" lvl="0" marL="0" rtl="0" algn="l">
+              <a:spcBef>
+                <a:spcPts val="0"/>
+              </a:spcBef>
+              <a:spcAft>
+                <a:spcPts val="0"/>
+              </a:spcAft>
+              <a:buNone/>
+            </a:pPr>
+            <a:r>
+              <a:rPr lang="en"/>
+              <a:t>React renders with the DOM (Document Object Model)</a:t>
+            </a:r>
+            <a:endParaRPr/>
+          </a:p>
+          <a:p>
+            <a:pPr indent="0" lvl="0" marL="0" rtl="0" algn="l">
+              <a:spcBef>
+                <a:spcPts val="0"/>
+              </a:spcBef>
+              <a:spcAft>
+                <a:spcPts val="0"/>
+              </a:spcAft>
+              <a:buNone/>
+            </a:pPr>
+            <a:r>
+              <a:rPr lang="en"/>
+              <a:t>When a component’s state changes, React ONLY reloads that one component (saves time and computation).</a:t>
+            </a:r>
+            <a:endParaRPr/>
+          </a:p>
+          <a:p>
+            <a:pPr indent="0" lvl="0" marL="0" rtl="0" algn="l">
+              <a:spcBef>
+                <a:spcPts val="0"/>
+              </a:spcBef>
+              <a:spcAft>
+                <a:spcPts val="0"/>
+              </a:spcAft>
+              <a:buNone/>
+            </a:pPr>
+            <a:r>
+              <a:rPr lang="en"/>
+              <a:t>Practically, react sees function/class components as the same. Choose whatever works for you.</a:t>
+            </a:r>
+            <a:endParaRPr/>
+          </a:p>
+          <a:p>
+            <a:pPr indent="0" lvl="0" marL="0" rtl="0" algn="l">
+              <a:spcBef>
+                <a:spcPts val="0"/>
+              </a:spcBef>
+              <a:spcAft>
+                <a:spcPts val="0"/>
+              </a:spcAft>
+              <a:buNone/>
+            </a:pPr>
+            <a:r>
+              <a:rPr lang="en"/>
+              <a:t>NOTE: The Functional approach takes advantage of newer syntax and features such as React Hooks. I would personally choose that route, but both are totally fine.</a:t>
+            </a:r>
+            <a:endParaRPr/>
+          </a:p>
+          <a:p>
+            <a:pPr indent="0" lvl="0" marL="0" rtl="0" algn="l">
+              <a:spcBef>
+                <a:spcPts val="0"/>
+              </a:spcBef>
+              <a:spcAft>
+                <a:spcPts val="0"/>
+              </a:spcAft>
+              <a:buNone/>
+            </a:pPr>
+            <a:r>
+              <a:t/>
+            </a:r>
+            <a:endParaRPr/>
+          </a:p>
+          <a:p>
+            <a:pPr indent="0" lvl="0" marL="0" rtl="0" algn="l">
+              <a:spcBef>
+                <a:spcPts val="0"/>
+              </a:spcBef>
+              <a:spcAft>
+                <a:spcPts val="0"/>
+              </a:spcAft>
+              <a:buNone/>
+            </a:pPr>
+            <a:r>
+              <a:rPr lang="en"/>
+              <a:t>Same props = same rendered component</a:t>
+            </a:r>
+            <a:endParaRPr/>
+          </a:p>
+          <a:p>
+            <a:pPr indent="0" lvl="0" marL="0" rtl="0" algn="l">
+              <a:spcBef>
+                <a:spcPts val="0"/>
+              </a:spcBef>
+              <a:spcAft>
+                <a:spcPts val="0"/>
+              </a:spcAft>
+              <a:buNone/>
+            </a:pPr>
+            <a:r>
+              <a:rPr lang="en"/>
+              <a:t>No side effects, and props are read only.</a:t>
+            </a:r>
+            <a:endParaRPr/>
+          </a:p>
+          <a:p>
+            <a:pPr indent="0" lvl="0" marL="0" rtl="0" algn="l">
+              <a:spcBef>
+                <a:spcPts val="0"/>
+              </a:spcBef>
+              <a:spcAft>
+                <a:spcPts val="0"/>
+              </a:spcAft>
+              <a:buNone/>
+            </a:pPr>
+            <a:r>
+              <a:t/>
+            </a:r>
+            <a:endParaRPr/>
+          </a:p>
           <a:p>
             <a:pPr indent="0" lvl="0" marL="0" rtl="0" algn="l">
               <a:spcBef>
@@ -1496,7 +1596,7 @@
       </p:grpSpPr>
       <p:sp>
         <p:nvSpPr>
-          <p:cNvPr id="100" name="Google Shape;100;gbcea66500f_0_144:notes"/>
+          <p:cNvPr id="100" name="Google Shape;100;gbcea66500f_0_139:notes"/>
           <p:cNvSpPr/>
           <p:nvPr>
             <p:ph idx="2" type="sldImg"/>
@@ -1531,7 +1631,7 @@
       </p:sp>
       <p:sp>
         <p:nvSpPr>
-          <p:cNvPr id="101" name="Google Shape;101;gbcea66500f_0_144:notes"/>
+          <p:cNvPr id="101" name="Google Shape;101;gbcea66500f_0_139:notes"/>
           <p:cNvSpPr txBox="1"/>
           <p:nvPr>
             <p:ph idx="1" type="body"/>
@@ -1562,72 +1662,7 @@
               <a:buNone/>
             </a:pPr>
             <a:r>
-              <a:rPr lang="en"/>
-              <a:t>React is based on parent-child relationships, like a tree data structure.</a:t>
-            </a:r>
-            <a:endParaRPr/>
-          </a:p>
-          <a:p>
-            <a:pPr indent="0" lvl="0" marL="0" rtl="0" algn="l">
-              <a:spcBef>
-                <a:spcPts val="0"/>
-              </a:spcBef>
-              <a:spcAft>
-                <a:spcPts val="0"/>
-              </a:spcAft>
-              <a:buNone/>
-            </a:pPr>
-            <a:r>
-              <a:rPr lang="en"/>
-              <a:t>Neither parent nor child components know directly if a component is stateful or stateless.</a:t>
-            </a:r>
-            <a:endParaRPr/>
-          </a:p>
-          <a:p>
-            <a:pPr indent="0" lvl="0" marL="0" rtl="0" algn="l">
-              <a:spcBef>
-                <a:spcPts val="0"/>
-              </a:spcBef>
-              <a:spcAft>
-                <a:spcPts val="0"/>
-              </a:spcAft>
-              <a:buNone/>
-            </a:pPr>
-            <a:r>
-              <a:rPr lang="en"/>
-              <a:t>Neither should care whether it is functional/class based.</a:t>
-            </a:r>
-            <a:endParaRPr/>
-          </a:p>
-          <a:p>
-            <a:pPr indent="0" lvl="0" marL="0" rtl="0" algn="l">
-              <a:spcBef>
-                <a:spcPts val="0"/>
-              </a:spcBef>
-              <a:spcAft>
-                <a:spcPts val="0"/>
-              </a:spcAft>
-              <a:buNone/>
-            </a:pPr>
-            <a:r>
-              <a:rPr lang="en"/>
-              <a:t>State is always encapsulated in a component.</a:t>
-            </a:r>
-            <a:endParaRPr/>
-          </a:p>
-          <a:p>
-            <a:pPr indent="0" lvl="0" marL="0" rtl="0" algn="l">
-              <a:spcBef>
-                <a:spcPts val="0"/>
-              </a:spcBef>
-              <a:spcAft>
-                <a:spcPts val="0"/>
-              </a:spcAft>
-              <a:buNone/>
-            </a:pPr>
-            <a:r>
-              <a:rPr lang="en"/>
-              <a:t>Pass state down to children as props</a:t>
+              <a:t/>
             </a:r>
             <a:endParaRPr/>
           </a:p>
@@ -1660,7 +1695,7 @@
       </p:grpSpPr>
       <p:sp>
         <p:nvSpPr>
-          <p:cNvPr id="106" name="Google Shape;106;gbcea66500f_0_149:notes"/>
+          <p:cNvPr id="106" name="Google Shape;106;gbcea66500f_0_144:notes"/>
           <p:cNvSpPr/>
           <p:nvPr>
             <p:ph idx="2" type="sldImg"/>
@@ -1695,7 +1730,7 @@
       </p:sp>
       <p:sp>
         <p:nvSpPr>
-          <p:cNvPr id="107" name="Google Shape;107;gbcea66500f_0_149:notes"/>
+          <p:cNvPr id="107" name="Google Shape;107;gbcea66500f_0_144:notes"/>
           <p:cNvSpPr txBox="1"/>
           <p:nvPr>
             <p:ph idx="1" type="body"/>
@@ -1716,188 +1751,82 @@
           </a:bodyPr>
           <a:lstStyle/>
           <a:p>
-            <a:pPr indent="-298450" lvl="0" marL="457200" rtl="0" algn="l">
-              <a:spcBef>
-                <a:spcPts val="0"/>
-              </a:spcBef>
-              <a:spcAft>
-                <a:spcPts val="0"/>
-              </a:spcAft>
-              <a:buSzPts val="1100"/>
-              <a:buAutoNum type="arabicPeriod"/>
+            <a:pPr indent="0" lvl="0" marL="0" rtl="0" algn="l">
+              <a:spcBef>
+                <a:spcPts val="0"/>
+              </a:spcBef>
+              <a:spcAft>
+                <a:spcPts val="0"/>
+              </a:spcAft>
+              <a:buNone/>
             </a:pPr>
             <a:r>
               <a:rPr lang="en"/>
-              <a:t>Think about what components you need, how to organize your code structure, and how data flows in your app</a:t>
-            </a:r>
-            <a:endParaRPr/>
-          </a:p>
-          <a:p>
-            <a:pPr indent="-298450" lvl="0" marL="457200" rtl="0" algn="l">
-              <a:spcBef>
-                <a:spcPts val="0"/>
-              </a:spcBef>
-              <a:spcAft>
-                <a:spcPts val="0"/>
-              </a:spcAft>
-              <a:buSzPts val="1100"/>
-              <a:buAutoNum type="arabicPeriod"/>
+              <a:t>React is based on parent-child relationships, like a tree data structure.</a:t>
+            </a:r>
+            <a:endParaRPr/>
+          </a:p>
+          <a:p>
+            <a:pPr indent="0" lvl="0" marL="0" rtl="0" algn="l">
+              <a:spcBef>
+                <a:spcPts val="0"/>
+              </a:spcBef>
+              <a:spcAft>
+                <a:spcPts val="0"/>
+              </a:spcAft>
+              <a:buNone/>
             </a:pPr>
             <a:r>
               <a:rPr lang="en"/>
-              <a:t>First focus on getting all the components done. Don’t worry about interactions yet.</a:t>
-            </a:r>
-            <a:endParaRPr/>
-          </a:p>
-          <a:p>
-            <a:pPr indent="-298450" lvl="1" marL="914400" rtl="0" algn="l">
-              <a:spcBef>
-                <a:spcPts val="0"/>
-              </a:spcBef>
-              <a:spcAft>
-                <a:spcPts val="0"/>
-              </a:spcAft>
-              <a:buSzPts val="1100"/>
-              <a:buAutoNum type="alphaLcPeriod"/>
+              <a:t>Neither parent nor child components know directly if a component is stateful or stateless.</a:t>
+            </a:r>
+            <a:endParaRPr/>
+          </a:p>
+          <a:p>
+            <a:pPr indent="0" lvl="0" marL="0" rtl="0" algn="l">
+              <a:spcBef>
+                <a:spcPts val="0"/>
+              </a:spcBef>
+              <a:spcAft>
+                <a:spcPts val="0"/>
+              </a:spcAft>
+              <a:buNone/>
             </a:pPr>
             <a:r>
               <a:rPr lang="en"/>
-              <a:t>Make sure they all conform to your data models (which you should think about as well)</a:t>
-            </a:r>
-            <a:endParaRPr/>
-          </a:p>
-          <a:p>
-            <a:pPr indent="-298450" lvl="0" marL="457200" rtl="0" algn="l">
-              <a:spcBef>
-                <a:spcPts val="0"/>
-              </a:spcBef>
-              <a:spcAft>
-                <a:spcPts val="0"/>
-              </a:spcAft>
-              <a:buSzPts val="1100"/>
-              <a:buAutoNum type="arabicPeriod"/>
+              <a:t>Neither should care whether it is functional/class based.</a:t>
+            </a:r>
+            <a:endParaRPr/>
+          </a:p>
+          <a:p>
+            <a:pPr indent="0" lvl="0" marL="0" rtl="0" algn="l">
+              <a:spcBef>
+                <a:spcPts val="0"/>
+              </a:spcBef>
+              <a:spcAft>
+                <a:spcPts val="0"/>
+              </a:spcAft>
+              <a:buNone/>
             </a:pPr>
             <a:r>
               <a:rPr lang="en"/>
-              <a:t>Try to identify the smallest set of mutable state each component needs. DRY: Don’t Repeat Yourself</a:t>
-            </a:r>
-            <a:endParaRPr/>
-          </a:p>
-          <a:p>
-            <a:pPr indent="-298450" lvl="1" marL="914400" rtl="0" algn="l">
-              <a:spcBef>
-                <a:spcPts val="0"/>
-              </a:spcBef>
-              <a:spcAft>
-                <a:spcPts val="0"/>
-              </a:spcAft>
-              <a:buSzPts val="1100"/>
-              <a:buAutoNum type="alphaLcPeriod"/>
+              <a:t>State is always encapsulated in a component.</a:t>
+            </a:r>
+            <a:endParaRPr/>
+          </a:p>
+          <a:p>
+            <a:pPr indent="0" lvl="0" marL="0" rtl="0" algn="l">
+              <a:spcBef>
+                <a:spcPts val="0"/>
+              </a:spcBef>
+              <a:spcAft>
+                <a:spcPts val="0"/>
+              </a:spcAft>
+              <a:buNone/>
             </a:pPr>
             <a:r>
               <a:rPr lang="en"/>
-              <a:t>Anything you can easily compute on the fly shouldn’t be in the state.</a:t>
-            </a:r>
-            <a:endParaRPr/>
-          </a:p>
-          <a:p>
-            <a:pPr indent="-298450" lvl="1" marL="914400" rtl="0" algn="l">
-              <a:spcBef>
-                <a:spcPts val="0"/>
-              </a:spcBef>
-              <a:spcAft>
-                <a:spcPts val="0"/>
-              </a:spcAft>
-              <a:buSzPts val="1100"/>
-              <a:buAutoNum type="alphaLcPeriod"/>
-            </a:pPr>
-            <a:r>
-              <a:rPr lang="en"/>
-              <a:t>Eg. list of products, search text, checkbox status, filtered list of products</a:t>
-            </a:r>
-            <a:endParaRPr/>
-          </a:p>
-          <a:p>
-            <a:pPr indent="-298450" lvl="1" marL="914400" rtl="0" algn="l">
-              <a:spcBef>
-                <a:spcPts val="0"/>
-              </a:spcBef>
-              <a:spcAft>
-                <a:spcPts val="0"/>
-              </a:spcAft>
-              <a:buSzPts val="1100"/>
-              <a:buAutoNum type="alphaLcPeriod"/>
-            </a:pPr>
-            <a:r>
-              <a:rPr lang="en"/>
-              <a:t>Is it passed from parents as props? (if so, not state)</a:t>
-            </a:r>
-            <a:endParaRPr/>
-          </a:p>
-          <a:p>
-            <a:pPr indent="-298450" lvl="1" marL="914400" rtl="0" algn="l">
-              <a:spcBef>
-                <a:spcPts val="0"/>
-              </a:spcBef>
-              <a:spcAft>
-                <a:spcPts val="0"/>
-              </a:spcAft>
-              <a:buSzPts val="1100"/>
-              <a:buAutoNum type="alphaLcPeriod"/>
-            </a:pPr>
-            <a:r>
-              <a:rPr lang="en"/>
-              <a:t>Does it remain unchanged? (if so, not state)</a:t>
-            </a:r>
-            <a:endParaRPr/>
-          </a:p>
-          <a:p>
-            <a:pPr indent="-298450" lvl="1" marL="914400" rtl="0" algn="l">
-              <a:spcBef>
-                <a:spcPts val="0"/>
-              </a:spcBef>
-              <a:spcAft>
-                <a:spcPts val="0"/>
-              </a:spcAft>
-              <a:buSzPts val="1100"/>
-              <a:buAutoNum type="alphaLcPeriod"/>
-            </a:pPr>
-            <a:r>
-              <a:rPr lang="en"/>
-              <a:t>Can you compute it based on other state/props? (if so, not state)</a:t>
-            </a:r>
-            <a:endParaRPr/>
-          </a:p>
-          <a:p>
-            <a:pPr indent="-298450" lvl="1" marL="914400" rtl="0" algn="l">
-              <a:spcBef>
-                <a:spcPts val="0"/>
-              </a:spcBef>
-              <a:spcAft>
-                <a:spcPts val="0"/>
-              </a:spcAft>
-              <a:buSzPts val="1100"/>
-              <a:buAutoNum type="alphaLcPeriod"/>
-            </a:pPr>
-            <a:r>
-              <a:rPr lang="en"/>
-              <a:t>Final state: search text, checkbox status</a:t>
-            </a:r>
-            <a:endParaRPr/>
-          </a:p>
-          <a:p>
-            <a:pPr indent="-298450" lvl="0" marL="457200" rtl="0" algn="l">
-              <a:spcBef>
-                <a:spcPts val="0"/>
-              </a:spcBef>
-              <a:spcAft>
-                <a:spcPts val="0"/>
-              </a:spcAft>
-              <a:buSzPts val="1100"/>
-              <a:buAutoNum type="arabicPeriod"/>
-            </a:pPr>
-            <a:r>
-              <a:t/>
+              <a:t>Pass state down to children as props</a:t>
             </a:r>
             <a:endParaRPr/>
           </a:p>
@@ -1930,7 +1859,7 @@
       </p:grpSpPr>
       <p:sp>
         <p:nvSpPr>
-          <p:cNvPr id="112" name="Google Shape;112;gbcea66500f_0_154:notes"/>
+          <p:cNvPr id="112" name="Google Shape;112;gbcea66500f_0_149:notes"/>
           <p:cNvSpPr/>
           <p:nvPr>
             <p:ph idx="2" type="sldImg"/>
@@ -1965,7 +1894,7 @@
       </p:sp>
       <p:sp>
         <p:nvSpPr>
-          <p:cNvPr id="113" name="Google Shape;113;gbcea66500f_0_154:notes"/>
+          <p:cNvPr id="113" name="Google Shape;113;gbcea66500f_0_149:notes"/>
           <p:cNvSpPr txBox="1"/>
           <p:nvPr>
             <p:ph idx="1" type="body"/>
@@ -1986,14 +1915,185 @@
           </a:bodyPr>
           <a:lstStyle/>
           <a:p>
-            <a:pPr indent="0" lvl="0" marL="0" rtl="0" algn="l">
-              <a:spcBef>
-                <a:spcPts val="0"/>
-              </a:spcBef>
-              <a:spcAft>
-                <a:spcPts val="0"/>
-              </a:spcAft>
-              <a:buNone/>
+            <a:pPr indent="-298450" lvl="0" marL="457200" rtl="0" algn="l">
+              <a:spcBef>
+                <a:spcPts val="0"/>
+              </a:spcBef>
+              <a:spcAft>
+                <a:spcPts val="0"/>
+              </a:spcAft>
+              <a:buSzPts val="1100"/>
+              <a:buAutoNum type="arabicPeriod"/>
+            </a:pPr>
+            <a:r>
+              <a:rPr lang="en"/>
+              <a:t>Think about what components you need, how to organize your code structure, and how data flows in your app</a:t>
+            </a:r>
+            <a:endParaRPr/>
+          </a:p>
+          <a:p>
+            <a:pPr indent="-298450" lvl="0" marL="457200" rtl="0" algn="l">
+              <a:spcBef>
+                <a:spcPts val="0"/>
+              </a:spcBef>
+              <a:spcAft>
+                <a:spcPts val="0"/>
+              </a:spcAft>
+              <a:buSzPts val="1100"/>
+              <a:buAutoNum type="arabicPeriod"/>
+            </a:pPr>
+            <a:r>
+              <a:rPr lang="en"/>
+              <a:t>First focus on getting all the components done. Don’t worry about interactions yet.</a:t>
+            </a:r>
+            <a:endParaRPr/>
+          </a:p>
+          <a:p>
+            <a:pPr indent="-298450" lvl="1" marL="914400" rtl="0" algn="l">
+              <a:spcBef>
+                <a:spcPts val="0"/>
+              </a:spcBef>
+              <a:spcAft>
+                <a:spcPts val="0"/>
+              </a:spcAft>
+              <a:buSzPts val="1100"/>
+              <a:buAutoNum type="alphaLcPeriod"/>
+            </a:pPr>
+            <a:r>
+              <a:rPr lang="en"/>
+              <a:t>Make sure they all conform to your data models (which you should think about as well)</a:t>
+            </a:r>
+            <a:endParaRPr/>
+          </a:p>
+          <a:p>
+            <a:pPr indent="-298450" lvl="0" marL="457200" rtl="0" algn="l">
+              <a:spcBef>
+                <a:spcPts val="0"/>
+              </a:spcBef>
+              <a:spcAft>
+                <a:spcPts val="0"/>
+              </a:spcAft>
+              <a:buSzPts val="1100"/>
+              <a:buAutoNum type="arabicPeriod"/>
+            </a:pPr>
+            <a:r>
+              <a:rPr lang="en"/>
+              <a:t>Try to identify the smallest set of mutable state each component needs. DRY: Don’t Repeat Yourself</a:t>
+            </a:r>
+            <a:endParaRPr/>
+          </a:p>
+          <a:p>
+            <a:pPr indent="-298450" lvl="1" marL="914400" rtl="0" algn="l">
+              <a:spcBef>
+                <a:spcPts val="0"/>
+              </a:spcBef>
+              <a:spcAft>
+                <a:spcPts val="0"/>
+              </a:spcAft>
+              <a:buSzPts val="1100"/>
+              <a:buAutoNum type="alphaLcPeriod"/>
+            </a:pPr>
+            <a:r>
+              <a:rPr lang="en"/>
+              <a:t>Anything you can easily compute on the fly shouldn’t be in the state.</a:t>
+            </a:r>
+            <a:endParaRPr/>
+          </a:p>
+          <a:p>
+            <a:pPr indent="-298450" lvl="1" marL="914400" rtl="0" algn="l">
+              <a:spcBef>
+                <a:spcPts val="0"/>
+              </a:spcBef>
+              <a:spcAft>
+                <a:spcPts val="0"/>
+              </a:spcAft>
+              <a:buSzPts val="1100"/>
+              <a:buAutoNum type="alphaLcPeriod"/>
+            </a:pPr>
+            <a:r>
+              <a:rPr lang="en"/>
+              <a:t>Eg. list of products, search text, checkbox status, filtered list of products</a:t>
+            </a:r>
+            <a:endParaRPr/>
+          </a:p>
+          <a:p>
+            <a:pPr indent="-298450" lvl="1" marL="914400" rtl="0" algn="l">
+              <a:spcBef>
+                <a:spcPts val="0"/>
+              </a:spcBef>
+              <a:spcAft>
+                <a:spcPts val="0"/>
+              </a:spcAft>
+              <a:buSzPts val="1100"/>
+              <a:buAutoNum type="alphaLcPeriod"/>
+            </a:pPr>
+            <a:r>
+              <a:rPr lang="en"/>
+              <a:t>Is it passed from parents as props? (if so, not state)</a:t>
+            </a:r>
+            <a:endParaRPr/>
+          </a:p>
+          <a:p>
+            <a:pPr indent="-298450" lvl="1" marL="914400" rtl="0" algn="l">
+              <a:spcBef>
+                <a:spcPts val="0"/>
+              </a:spcBef>
+              <a:spcAft>
+                <a:spcPts val="0"/>
+              </a:spcAft>
+              <a:buSzPts val="1100"/>
+              <a:buAutoNum type="alphaLcPeriod"/>
+            </a:pPr>
+            <a:r>
+              <a:rPr lang="en"/>
+              <a:t>Does it remain unchanged? (if so, not state)</a:t>
+            </a:r>
+            <a:endParaRPr/>
+          </a:p>
+          <a:p>
+            <a:pPr indent="-298450" lvl="1" marL="914400" rtl="0" algn="l">
+              <a:spcBef>
+                <a:spcPts val="0"/>
+              </a:spcBef>
+              <a:spcAft>
+                <a:spcPts val="0"/>
+              </a:spcAft>
+              <a:buSzPts val="1100"/>
+              <a:buAutoNum type="alphaLcPeriod"/>
+            </a:pPr>
+            <a:r>
+              <a:rPr lang="en"/>
+              <a:t>Can you compute it based on other state/props? (if so, not state)</a:t>
+            </a:r>
+            <a:endParaRPr/>
+          </a:p>
+          <a:p>
+            <a:pPr indent="-298450" lvl="1" marL="914400" rtl="0" algn="l">
+              <a:spcBef>
+                <a:spcPts val="0"/>
+              </a:spcBef>
+              <a:spcAft>
+                <a:spcPts val="0"/>
+              </a:spcAft>
+              <a:buSzPts val="1100"/>
+              <a:buAutoNum type="alphaLcPeriod"/>
+            </a:pPr>
+            <a:r>
+              <a:rPr lang="en"/>
+              <a:t>Final state: search text, checkbox status</a:t>
+            </a:r>
+            <a:endParaRPr/>
+          </a:p>
+          <a:p>
+            <a:pPr indent="-298450" lvl="0" marL="457200" rtl="0" algn="l">
+              <a:spcBef>
+                <a:spcPts val="0"/>
+              </a:spcBef>
+              <a:spcAft>
+                <a:spcPts val="0"/>
+              </a:spcAft>
+              <a:buSzPts val="1100"/>
+              <a:buAutoNum type="arabicPeriod"/>
             </a:pPr>
             <a:r>
               <a:t/>
@@ -7423,6 +7523,243 @@
 </p:sld>
 </file>
 
+<file path=ppt/slides/slide10.xml><?xml version="1.0" encoding="utf-8"?>
+<p:sld xmlns:a="http://schemas.openxmlformats.org/drawingml/2006/main" xmlns:r="http://schemas.openxmlformats.org/officeDocument/2006/relationships" xmlns:mc="http://schemas.openxmlformats.org/markup-compatibility/2006" xmlns:mv="urn:schemas-microsoft-com:mac:vml" xmlns:p="http://schemas.openxmlformats.org/presentationml/2006/main" xmlns:c="http://schemas.openxmlformats.org/drawingml/2006/chart" xmlns:dgm="http://schemas.openxmlformats.org/drawingml/2006/diagram" xmlns:o="urn:schemas-microsoft-com:office:office" xmlns:v="urn:schemas-microsoft-com:vml" xmlns:pvml="urn:schemas-microsoft-com:office:powerpoint" xmlns:com="http://schemas.openxmlformats.org/drawingml/2006/compatibility" xmlns:p14="http://schemas.microsoft.com/office/powerpoint/2010/main" xmlns:p15="http://schemas.microsoft.com/office/powerpoint/2012/main" xmlns:ahyp="http://schemas.microsoft.com/office/drawing/2018/hyperlinkcolor">
+  <p:cSld>
+    <p:spTree>
+      <p:nvGrpSpPr>
+        <p:cNvPr id="120" name="Shape 120"/>
+        <p:cNvGrpSpPr/>
+        <p:nvPr/>
+      </p:nvGrpSpPr>
+      <p:grpSpPr>
+        <a:xfrm>
+          <a:off x="0" y="0"/>
+          <a:ext cx="0" cy="0"/>
+          <a:chOff x="0" y="0"/>
+          <a:chExt cx="0" cy="0"/>
+        </a:xfrm>
+      </p:grpSpPr>
+      <p:sp>
+        <p:nvSpPr>
+          <p:cNvPr id="121" name="Google Shape;121;p22"/>
+          <p:cNvSpPr txBox="1"/>
+          <p:nvPr>
+            <p:ph type="title"/>
+          </p:nvPr>
+        </p:nvSpPr>
+        <p:spPr>
+          <a:xfrm>
+            <a:off x="387900" y="458025"/>
+            <a:ext cx="8368200" cy="686100"/>
+          </a:xfrm>
+          <a:prstGeom prst="rect">
+            <a:avLst/>
+          </a:prstGeom>
+        </p:spPr>
+        <p:txBody>
+          <a:bodyPr anchorCtr="0" anchor="b" bIns="91425" lIns="91425" spcFirstLastPara="1" rIns="91425" wrap="square" tIns="91425">
+            <a:normAutofit/>
+          </a:bodyPr>
+          <a:lstStyle/>
+          <a:p>
+            <a:pPr indent="0" lvl="0" marL="0" rtl="0" algn="l">
+              <a:spcBef>
+                <a:spcPts val="0"/>
+              </a:spcBef>
+              <a:spcAft>
+                <a:spcPts val="0"/>
+              </a:spcAft>
+              <a:buNone/>
+            </a:pPr>
+            <a:r>
+              <a:rPr lang="en"/>
+              <a:t>Component Libraries/Frameworks</a:t>
+            </a:r>
+            <a:endParaRPr/>
+          </a:p>
+        </p:txBody>
+      </p:sp>
+      <p:sp>
+        <p:nvSpPr>
+          <p:cNvPr id="122" name="Google Shape;122;p22"/>
+          <p:cNvSpPr txBox="1"/>
+          <p:nvPr>
+            <p:ph idx="1" type="body"/>
+          </p:nvPr>
+        </p:nvSpPr>
+        <p:spPr>
+          <a:xfrm>
+            <a:off x="387900" y="1489825"/>
+            <a:ext cx="8368200" cy="3527400"/>
+          </a:xfrm>
+          <a:prstGeom prst="rect">
+            <a:avLst/>
+          </a:prstGeom>
+        </p:spPr>
+        <p:txBody>
+          <a:bodyPr anchorCtr="0" anchor="t" bIns="91425" lIns="91425" spcFirstLastPara="1" rIns="91425" wrap="square" tIns="91425">
+            <a:normAutofit lnSpcReduction="10000"/>
+          </a:bodyPr>
+          <a:lstStyle/>
+          <a:p>
+            <a:pPr indent="0" lvl="0" marL="0" rtl="0" algn="l">
+              <a:spcBef>
+                <a:spcPts val="0"/>
+              </a:spcBef>
+              <a:spcAft>
+                <a:spcPts val="0"/>
+              </a:spcAft>
+              <a:buNone/>
+            </a:pPr>
+            <a:r>
+              <a:rPr lang="en"/>
+              <a:t>SUPER USEFUL (and fun to explore)</a:t>
+            </a:r>
+            <a:endParaRPr/>
+          </a:p>
+          <a:p>
+            <a:pPr indent="0" lvl="0" marL="0" rtl="0" algn="l">
+              <a:spcBef>
+                <a:spcPts val="1200"/>
+              </a:spcBef>
+              <a:spcAft>
+                <a:spcPts val="0"/>
+              </a:spcAft>
+              <a:buNone/>
+            </a:pPr>
+            <a:r>
+              <a:rPr lang="en"/>
+              <a:t>You no longer have to style everything by hand (b/c CSS bad).</a:t>
+            </a:r>
+            <a:endParaRPr/>
+          </a:p>
+          <a:p>
+            <a:pPr indent="0" lvl="0" marL="0" rtl="0" algn="l">
+              <a:spcBef>
+                <a:spcPts val="1200"/>
+              </a:spcBef>
+              <a:spcAft>
+                <a:spcPts val="0"/>
+              </a:spcAft>
+              <a:buNone/>
+            </a:pPr>
+            <a:r>
+              <a:rPr lang="en"/>
+              <a:t>Find one that you enjoy and read the docs on how to use it!</a:t>
+            </a:r>
+            <a:endParaRPr/>
+          </a:p>
+          <a:p>
+            <a:pPr indent="0" lvl="0" marL="0" rtl="0" algn="l">
+              <a:spcBef>
+                <a:spcPts val="1200"/>
+              </a:spcBef>
+              <a:spcAft>
+                <a:spcPts val="0"/>
+              </a:spcAft>
+              <a:buNone/>
+            </a:pPr>
+            <a:r>
+              <a:rPr lang="en"/>
+              <a:t>Popular ones:</a:t>
+            </a:r>
+            <a:endParaRPr/>
+          </a:p>
+          <a:p>
+            <a:pPr indent="-342900" lvl="0" marL="457200" rtl="0" algn="l">
+              <a:spcBef>
+                <a:spcPts val="1200"/>
+              </a:spcBef>
+              <a:spcAft>
+                <a:spcPts val="0"/>
+              </a:spcAft>
+              <a:buSzPts val="1800"/>
+              <a:buChar char="-"/>
+            </a:pPr>
+            <a:r>
+              <a:rPr lang="en"/>
+              <a:t>MaterialUI (google)</a:t>
+            </a:r>
+            <a:endParaRPr/>
+          </a:p>
+          <a:p>
+            <a:pPr indent="-342900" lvl="0" marL="457200" rtl="0" algn="l">
+              <a:spcBef>
+                <a:spcPts val="0"/>
+              </a:spcBef>
+              <a:spcAft>
+                <a:spcPts val="0"/>
+              </a:spcAft>
+              <a:buSzPts val="1800"/>
+              <a:buChar char="-"/>
+            </a:pPr>
+            <a:r>
+              <a:rPr lang="en"/>
+              <a:t>Bootstrap</a:t>
+            </a:r>
+            <a:endParaRPr/>
+          </a:p>
+          <a:p>
+            <a:pPr indent="-342900" lvl="0" marL="457200" rtl="0" algn="l">
+              <a:spcBef>
+                <a:spcPts val="0"/>
+              </a:spcBef>
+              <a:spcAft>
+                <a:spcPts val="0"/>
+              </a:spcAft>
+              <a:buSzPts val="1800"/>
+              <a:buChar char="-"/>
+            </a:pPr>
+            <a:r>
+              <a:rPr lang="en"/>
+              <a:t>Ant Design (Ant Financial, Alibaba)</a:t>
+            </a:r>
+            <a:endParaRPr/>
+          </a:p>
+          <a:p>
+            <a:pPr indent="-342900" lvl="0" marL="457200" rtl="0" algn="l">
+              <a:spcBef>
+                <a:spcPts val="0"/>
+              </a:spcBef>
+              <a:spcAft>
+                <a:spcPts val="0"/>
+              </a:spcAft>
+              <a:buSzPts val="1800"/>
+              <a:buChar char="-"/>
+            </a:pPr>
+            <a:r>
+              <a:rPr lang="en"/>
+              <a:t>Evergreen</a:t>
+            </a:r>
+            <a:endParaRPr/>
+          </a:p>
+          <a:p>
+            <a:pPr indent="0" lvl="0" marL="0" rtl="0" algn="l">
+              <a:spcBef>
+                <a:spcPts val="1200"/>
+              </a:spcBef>
+              <a:spcAft>
+                <a:spcPts val="1200"/>
+              </a:spcAft>
+              <a:buNone/>
+            </a:pPr>
+            <a:r>
+              <a:rPr lang="en"/>
+              <a:t>We’re gonna use Geist UI (more obscure, to get used to learning weird things)</a:t>
+            </a:r>
+            <a:endParaRPr/>
+          </a:p>
+        </p:txBody>
+      </p:sp>
+    </p:spTree>
+  </p:cSld>
+  <p:clrMapOvr>
+    <a:masterClrMapping/>
+  </p:clrMapOvr>
+</p:sld>
+</file>
+
 <file path=ppt/slides/slide2.xml><?xml version="1.0" encoding="utf-8"?>
 <p:sld xmlns:a="http://schemas.openxmlformats.org/drawingml/2006/main" xmlns:r="http://schemas.openxmlformats.org/officeDocument/2006/relationships" xmlns:mc="http://schemas.openxmlformats.org/markup-compatibility/2006" xmlns:mv="urn:schemas-microsoft-com:mac:vml" xmlns:p="http://schemas.openxmlformats.org/presentationml/2006/main" xmlns:c="http://schemas.openxmlformats.org/drawingml/2006/chart" xmlns:dgm="http://schemas.openxmlformats.org/drawingml/2006/diagram" xmlns:o="urn:schemas-microsoft-com:office:office" xmlns:v="urn:schemas-microsoft-com:vml" xmlns:pvml="urn:schemas-microsoft-com:office:powerpoint" xmlns:com="http://schemas.openxmlformats.org/drawingml/2006/compatibility" xmlns:p14="http://schemas.microsoft.com/office/powerpoint/2010/main" xmlns:p15="http://schemas.microsoft.com/office/powerpoint/2012/main" xmlns:ahyp="http://schemas.microsoft.com/office/drawing/2018/hyperlinkcolor">
   <p:cSld>
@@ -7789,7 +8126,7 @@
             </a:pPr>
             <a:r>
               <a:rPr lang="en"/>
-              <a:t>Intro to ReactJS (or just React)</a:t>
+              <a:t>Interruption: Styling and CSS</a:t>
             </a:r>
             <a:endParaRPr/>
           </a:p>
@@ -7814,6 +8151,200 @@
         </p:spPr>
         <p:txBody>
           <a:bodyPr anchorCtr="0" anchor="t" bIns="91425" lIns="91425" spcFirstLastPara="1" rIns="91425" wrap="square" tIns="91425">
+            <a:normAutofit lnSpcReduction="10000"/>
+          </a:bodyPr>
+          <a:lstStyle/>
+          <a:p>
+            <a:pPr indent="0" lvl="0" marL="0" rtl="0" algn="l">
+              <a:spcBef>
+                <a:spcPts val="0"/>
+              </a:spcBef>
+              <a:spcAft>
+                <a:spcPts val="0"/>
+              </a:spcAft>
+              <a:buNone/>
+            </a:pPr>
+            <a:r>
+              <a:rPr lang="en"/>
+              <a:t>We don’t have a dedicated recitation for styling, because there are so many many systems you can follow.</a:t>
+            </a:r>
+            <a:endParaRPr/>
+          </a:p>
+          <a:p>
+            <a:pPr indent="0" lvl="0" marL="0" rtl="0" algn="l">
+              <a:spcBef>
+                <a:spcPts val="1200"/>
+              </a:spcBef>
+              <a:spcAft>
+                <a:spcPts val="0"/>
+              </a:spcAft>
+              <a:buNone/>
+            </a:pPr>
+            <a:r>
+              <a:rPr lang="en"/>
+              <a:t>Google is your friend.</a:t>
+            </a:r>
+            <a:endParaRPr/>
+          </a:p>
+          <a:p>
+            <a:pPr indent="0" lvl="0" marL="0" rtl="0" algn="l">
+              <a:spcBef>
+                <a:spcPts val="1200"/>
+              </a:spcBef>
+              <a:spcAft>
+                <a:spcPts val="0"/>
+              </a:spcAft>
+              <a:buNone/>
+            </a:pPr>
+            <a:r>
+              <a:rPr lang="en"/>
+              <a:t>My personal pick: Flexbox</a:t>
+            </a:r>
+            <a:endParaRPr/>
+          </a:p>
+          <a:p>
+            <a:pPr indent="0" lvl="0" marL="0" rtl="0" algn="l">
+              <a:spcBef>
+                <a:spcPts val="1200"/>
+              </a:spcBef>
+              <a:spcAft>
+                <a:spcPts val="0"/>
+              </a:spcAft>
+              <a:buNone/>
+            </a:pPr>
+            <a:r>
+              <a:rPr lang="en" u="sng">
+                <a:solidFill>
+                  <a:schemeClr val="hlink"/>
+                </a:solidFill>
+                <a:hlinkClick r:id="rId3"/>
+              </a:rPr>
+              <a:t>https://developer.mozilla.org/en-US/docs/Learn/CSS/CSS_layout/Flexbox</a:t>
+            </a:r>
+            <a:endParaRPr/>
+          </a:p>
+          <a:p>
+            <a:pPr indent="0" lvl="0" marL="0" rtl="0" algn="l">
+              <a:spcBef>
+                <a:spcPts val="1200"/>
+              </a:spcBef>
+              <a:spcAft>
+                <a:spcPts val="0"/>
+              </a:spcAft>
+              <a:buNone/>
+            </a:pPr>
+            <a:r>
+              <a:rPr lang="en" u="sng">
+                <a:solidFill>
+                  <a:schemeClr val="hlink"/>
+                </a:solidFill>
+                <a:hlinkClick r:id="rId4"/>
+              </a:rPr>
+              <a:t>https://www.youtube.com/watch?v=JJSoEo8JSnc</a:t>
+            </a:r>
+            <a:endParaRPr/>
+          </a:p>
+          <a:p>
+            <a:pPr indent="0" lvl="0" marL="0" rtl="0" algn="l">
+              <a:spcBef>
+                <a:spcPts val="1200"/>
+              </a:spcBef>
+              <a:spcAft>
+                <a:spcPts val="1200"/>
+              </a:spcAft>
+              <a:buNone/>
+            </a:pPr>
+            <a:r>
+              <a:t/>
+            </a:r>
+            <a:endParaRPr/>
+          </a:p>
+        </p:txBody>
+      </p:sp>
+    </p:spTree>
+  </p:cSld>
+  <p:clrMapOvr>
+    <a:masterClrMapping/>
+  </p:clrMapOvr>
+</p:sld>
+</file>
+
+<file path=ppt/slides/slide5.xml><?xml version="1.0" encoding="utf-8"?>
+<p:sld xmlns:a="http://schemas.openxmlformats.org/drawingml/2006/main" xmlns:r="http://schemas.openxmlformats.org/officeDocument/2006/relationships" xmlns:mc="http://schemas.openxmlformats.org/markup-compatibility/2006" xmlns:mv="urn:schemas-microsoft-com:mac:vml" xmlns:p="http://schemas.openxmlformats.org/presentationml/2006/main" xmlns:c="http://schemas.openxmlformats.org/drawingml/2006/chart" xmlns:dgm="http://schemas.openxmlformats.org/drawingml/2006/diagram" xmlns:o="urn:schemas-microsoft-com:office:office" xmlns:v="urn:schemas-microsoft-com:vml" xmlns:pvml="urn:schemas-microsoft-com:office:powerpoint" xmlns:com="http://schemas.openxmlformats.org/drawingml/2006/compatibility" xmlns:p14="http://schemas.microsoft.com/office/powerpoint/2010/main" xmlns:p15="http://schemas.microsoft.com/office/powerpoint/2012/main" xmlns:ahyp="http://schemas.microsoft.com/office/drawing/2018/hyperlinkcolor">
+  <p:cSld>
+    <p:spTree>
+      <p:nvGrpSpPr>
+        <p:cNvPr id="87" name="Shape 87"/>
+        <p:cNvGrpSpPr/>
+        <p:nvPr/>
+      </p:nvGrpSpPr>
+      <p:grpSpPr>
+        <a:xfrm>
+          <a:off x="0" y="0"/>
+          <a:ext cx="0" cy="0"/>
+          <a:chOff x="0" y="0"/>
+          <a:chExt cx="0" cy="0"/>
+        </a:xfrm>
+      </p:grpSpPr>
+      <p:sp>
+        <p:nvSpPr>
+          <p:cNvPr id="88" name="Google Shape;88;p17"/>
+          <p:cNvSpPr txBox="1"/>
+          <p:nvPr>
+            <p:ph type="title"/>
+          </p:nvPr>
+        </p:nvSpPr>
+        <p:spPr>
+          <a:xfrm>
+            <a:off x="387900" y="458025"/>
+            <a:ext cx="8368200" cy="686100"/>
+          </a:xfrm>
+          <a:prstGeom prst="rect">
+            <a:avLst/>
+          </a:prstGeom>
+        </p:spPr>
+        <p:txBody>
+          <a:bodyPr anchorCtr="0" anchor="b" bIns="91425" lIns="91425" spcFirstLastPara="1" rIns="91425" wrap="square" tIns="91425">
+            <a:normAutofit/>
+          </a:bodyPr>
+          <a:lstStyle/>
+          <a:p>
+            <a:pPr indent="0" lvl="0" marL="0" rtl="0" algn="l">
+              <a:spcBef>
+                <a:spcPts val="0"/>
+              </a:spcBef>
+              <a:spcAft>
+                <a:spcPts val="0"/>
+              </a:spcAft>
+              <a:buNone/>
+            </a:pPr>
+            <a:r>
+              <a:rPr lang="en"/>
+              <a:t>Intro to ReactJS (or just React)</a:t>
+            </a:r>
+            <a:endParaRPr/>
+          </a:p>
+        </p:txBody>
+      </p:sp>
+      <p:sp>
+        <p:nvSpPr>
+          <p:cNvPr id="89" name="Google Shape;89;p17"/>
+          <p:cNvSpPr txBox="1"/>
+          <p:nvPr>
+            <p:ph idx="1" type="body"/>
+          </p:nvPr>
+        </p:nvSpPr>
+        <p:spPr>
+          <a:xfrm>
+            <a:off x="387900" y="1489824"/>
+            <a:ext cx="8368200" cy="3078900"/>
+          </a:xfrm>
+          <a:prstGeom prst="rect">
+            <a:avLst/>
+          </a:prstGeom>
+        </p:spPr>
+        <p:txBody>
+          <a:bodyPr anchorCtr="0" anchor="t" bIns="91425" lIns="91425" spcFirstLastPara="1" rIns="91425" wrap="square" tIns="91425">
             <a:normAutofit/>
           </a:bodyPr>
           <a:lstStyle/>
@@ -7885,7 +8416,7 @@
       </p:sp>
       <p:pic>
         <p:nvPicPr>
-          <p:cNvPr id="84" name="Google Shape;84;p16"/>
+          <p:cNvPr id="90" name="Google Shape;90;p17"/>
           <p:cNvPicPr preferRelativeResize="0"/>
           <p:nvPr/>
         </p:nvPicPr>
@@ -7919,12 +8450,12 @@
 </p:sld>
 </file>
 
-<file path=ppt/slides/slide5.xml><?xml version="1.0" encoding="utf-8"?>
+<file path=ppt/slides/slide6.xml><?xml version="1.0" encoding="utf-8"?>
 <p:sld xmlns:a="http://schemas.openxmlformats.org/drawingml/2006/main" xmlns:r="http://schemas.openxmlformats.org/officeDocument/2006/relationships" xmlns:mc="http://schemas.openxmlformats.org/markup-compatibility/2006" xmlns:mv="urn:schemas-microsoft-com:mac:vml" xmlns:p="http://schemas.openxmlformats.org/presentationml/2006/main" xmlns:c="http://schemas.openxmlformats.org/drawingml/2006/chart" xmlns:dgm="http://schemas.openxmlformats.org/drawingml/2006/diagram" xmlns:o="urn:schemas-microsoft-com:office:office" xmlns:v="urn:schemas-microsoft-com:vml" xmlns:pvml="urn:schemas-microsoft-com:office:powerpoint" xmlns:com="http://schemas.openxmlformats.org/drawingml/2006/compatibility" xmlns:p14="http://schemas.microsoft.com/office/powerpoint/2010/main" xmlns:p15="http://schemas.microsoft.com/office/powerpoint/2012/main" xmlns:ahyp="http://schemas.microsoft.com/office/drawing/2018/hyperlinkcolor">
   <p:cSld>
     <p:spTree>
       <p:nvGrpSpPr>
-        <p:cNvPr id="88" name="Shape 88"/>
+        <p:cNvPr id="94" name="Shape 94"/>
         <p:cNvGrpSpPr/>
         <p:nvPr/>
       </p:nvGrpSpPr>
@@ -7938,7 +8469,7 @@
       </p:grpSpPr>
       <p:sp>
         <p:nvSpPr>
-          <p:cNvPr id="89" name="Google Shape;89;p17"/>
+          <p:cNvPr id="95" name="Google Shape;95;p18"/>
           <p:cNvSpPr txBox="1"/>
           <p:nvPr>
             <p:ph type="title"/>
@@ -7978,7 +8509,7 @@
       </p:sp>
       <p:sp>
         <p:nvSpPr>
-          <p:cNvPr id="90" name="Google Shape;90;p17"/>
+          <p:cNvPr id="96" name="Google Shape;96;p18"/>
           <p:cNvSpPr txBox="1"/>
           <p:nvPr>
             <p:ph idx="1" type="body"/>
@@ -8096,7 +8627,7 @@
       </p:sp>
       <p:pic>
         <p:nvPicPr>
-          <p:cNvPr id="91" name="Google Shape;91;p17"/>
+          <p:cNvPr id="97" name="Google Shape;97;p18"/>
           <p:cNvPicPr preferRelativeResize="0"/>
           <p:nvPr/>
         </p:nvPicPr>
@@ -8124,7 +8655,7 @@
       </p:pic>
       <p:pic>
         <p:nvPicPr>
-          <p:cNvPr id="92" name="Google Shape;92;p17"/>
+          <p:cNvPr id="98" name="Google Shape;98;p18"/>
           <p:cNvPicPr preferRelativeResize="0"/>
           <p:nvPr/>
         </p:nvPicPr>
@@ -8150,177 +8681,6 @@
           </a:ln>
         </p:spPr>
       </p:pic>
-    </p:spTree>
-  </p:cSld>
-  <p:clrMapOvr>
-    <a:masterClrMapping/>
-  </p:clrMapOvr>
-</p:sld>
-</file>
-
-<file path=ppt/slides/slide6.xml><?xml version="1.0" encoding="utf-8"?>
-<p:sld xmlns:a="http://schemas.openxmlformats.org/drawingml/2006/main" xmlns:r="http://schemas.openxmlformats.org/officeDocument/2006/relationships" xmlns:mc="http://schemas.openxmlformats.org/markup-compatibility/2006" xmlns:mv="urn:schemas-microsoft-com:mac:vml" xmlns:p="http://schemas.openxmlformats.org/presentationml/2006/main" xmlns:c="http://schemas.openxmlformats.org/drawingml/2006/chart" xmlns:dgm="http://schemas.openxmlformats.org/drawingml/2006/diagram" xmlns:o="urn:schemas-microsoft-com:office:office" xmlns:v="urn:schemas-microsoft-com:vml" xmlns:pvml="urn:schemas-microsoft-com:office:powerpoint" xmlns:com="http://schemas.openxmlformats.org/drawingml/2006/compatibility" xmlns:p14="http://schemas.microsoft.com/office/powerpoint/2010/main" xmlns:p15="http://schemas.microsoft.com/office/powerpoint/2012/main" xmlns:ahyp="http://schemas.microsoft.com/office/drawing/2018/hyperlinkcolor">
-  <p:cSld>
-    <p:spTree>
-      <p:nvGrpSpPr>
-        <p:cNvPr id="96" name="Shape 96"/>
-        <p:cNvGrpSpPr/>
-        <p:nvPr/>
-      </p:nvGrpSpPr>
-      <p:grpSpPr>
-        <a:xfrm>
-          <a:off x="0" y="0"/>
-          <a:ext cx="0" cy="0"/>
-          <a:chOff x="0" y="0"/>
-          <a:chExt cx="0" cy="0"/>
-        </a:xfrm>
-      </p:grpSpPr>
-      <p:sp>
-        <p:nvSpPr>
-          <p:cNvPr id="97" name="Google Shape;97;p18"/>
-          <p:cNvSpPr txBox="1"/>
-          <p:nvPr>
-            <p:ph type="title"/>
-          </p:nvPr>
-        </p:nvSpPr>
-        <p:spPr>
-          <a:xfrm>
-            <a:off x="387900" y="458025"/>
-            <a:ext cx="8368200" cy="686100"/>
-          </a:xfrm>
-          <a:prstGeom prst="rect">
-            <a:avLst/>
-          </a:prstGeom>
-        </p:spPr>
-        <p:txBody>
-          <a:bodyPr anchorCtr="0" anchor="b" bIns="91425" lIns="91425" spcFirstLastPara="1" rIns="91425" wrap="square" tIns="91425">
-            <a:normAutofit/>
-          </a:bodyPr>
-          <a:lstStyle/>
-          <a:p>
-            <a:pPr indent="0" lvl="0" marL="0" rtl="0" algn="l">
-              <a:spcBef>
-                <a:spcPts val="0"/>
-              </a:spcBef>
-              <a:spcAft>
-                <a:spcPts val="0"/>
-              </a:spcAft>
-              <a:buNone/>
-            </a:pPr>
-            <a:r>
-              <a:rPr lang="en"/>
-              <a:t>React: Components + State</a:t>
-            </a:r>
-            <a:endParaRPr/>
-          </a:p>
-        </p:txBody>
-      </p:sp>
-      <p:sp>
-        <p:nvSpPr>
-          <p:cNvPr id="98" name="Google Shape;98;p18"/>
-          <p:cNvSpPr txBox="1"/>
-          <p:nvPr>
-            <p:ph idx="1" type="body"/>
-          </p:nvPr>
-        </p:nvSpPr>
-        <p:spPr>
-          <a:xfrm>
-            <a:off x="387900" y="1489824"/>
-            <a:ext cx="8368200" cy="3078900"/>
-          </a:xfrm>
-          <a:prstGeom prst="rect">
-            <a:avLst/>
-          </a:prstGeom>
-        </p:spPr>
-        <p:txBody>
-          <a:bodyPr anchorCtr="0" anchor="t" bIns="91425" lIns="91425" spcFirstLastPara="1" rIns="91425" wrap="square" tIns="91425">
-            <a:normAutofit/>
-          </a:bodyPr>
-          <a:lstStyle/>
-          <a:p>
-            <a:pPr indent="0" lvl="0" marL="0" rtl="0" algn="l">
-              <a:spcBef>
-                <a:spcPts val="0"/>
-              </a:spcBef>
-              <a:spcAft>
-                <a:spcPts val="0"/>
-              </a:spcAft>
-              <a:buNone/>
-            </a:pPr>
-            <a:r>
-              <a:rPr lang="en"/>
-              <a:t>Component State = saved (and usually important) information about a component</a:t>
-            </a:r>
-            <a:endParaRPr/>
-          </a:p>
-          <a:p>
-            <a:pPr indent="0" lvl="0" marL="0" rtl="0" algn="l">
-              <a:spcBef>
-                <a:spcPts val="1200"/>
-              </a:spcBef>
-              <a:spcAft>
-                <a:spcPts val="0"/>
-              </a:spcAft>
-              <a:buNone/>
-            </a:pPr>
-            <a:r>
-              <a:rPr lang="en"/>
-              <a:t>Changing state -&gt; trigger a component reload</a:t>
-            </a:r>
-            <a:endParaRPr/>
-          </a:p>
-          <a:p>
-            <a:pPr indent="0" lvl="0" marL="0" rtl="0" algn="l">
-              <a:spcBef>
-                <a:spcPts val="1200"/>
-              </a:spcBef>
-              <a:spcAft>
-                <a:spcPts val="0"/>
-              </a:spcAft>
-              <a:buNone/>
-            </a:pPr>
-            <a:r>
-              <a:rPr b="1" lang="en"/>
-              <a:t>Do not</a:t>
-            </a:r>
-            <a:r>
-              <a:rPr lang="en"/>
-              <a:t> modify state directly (will not trigger reload). Use React’s state funcs.</a:t>
-            </a:r>
-            <a:endParaRPr/>
-          </a:p>
-          <a:p>
-            <a:pPr indent="0" lvl="0" marL="0" rtl="0" algn="l">
-              <a:spcBef>
-                <a:spcPts val="1200"/>
-              </a:spcBef>
-              <a:spcAft>
-                <a:spcPts val="0"/>
-              </a:spcAft>
-              <a:buNone/>
-            </a:pPr>
-            <a:r>
-              <a:t/>
-            </a:r>
-            <a:endParaRPr/>
-          </a:p>
-          <a:p>
-            <a:pPr indent="0" lvl="0" marL="0" rtl="0" algn="l">
-              <a:spcBef>
-                <a:spcPts val="1200"/>
-              </a:spcBef>
-              <a:spcAft>
-                <a:spcPts val="1200"/>
-              </a:spcAft>
-              <a:buNone/>
-            </a:pPr>
-            <a:r>
-              <a:t/>
-            </a:r>
-            <a:endParaRPr/>
-          </a:p>
-        </p:txBody>
-      </p:sp>
     </p:spTree>
   </p:cSld>
   <p:clrMapOvr>
@@ -8380,7 +8740,7 @@
             </a:pPr>
             <a:r>
               <a:rPr lang="en"/>
-              <a:t>React: Data (States &amp; Props) Flow</a:t>
+              <a:t>React: Components + State</a:t>
             </a:r>
             <a:endParaRPr/>
           </a:p>
@@ -8405,7 +8765,7 @@
         </p:spPr>
         <p:txBody>
           <a:bodyPr anchorCtr="0" anchor="t" bIns="91425" lIns="91425" spcFirstLastPara="1" rIns="91425" wrap="square" tIns="91425">
-            <a:normAutofit lnSpcReduction="20000"/>
+            <a:normAutofit/>
           </a:bodyPr>
           <a:lstStyle/>
           <a:p>
@@ -8420,7 +8780,7 @@
             </a:pPr>
             <a:r>
               <a:rPr lang="en"/>
-              <a:t>Parent-Child relationships (think Tree)</a:t>
+              <a:t>Component State = saved (and usually important) information about a component</a:t>
             </a:r>
             <a:endParaRPr/>
           </a:p>
@@ -8436,7 +8796,7 @@
             </a:pPr>
             <a:r>
               <a:rPr lang="en"/>
-              <a:t>State is always local, but can flow downwards (to children) as props.</a:t>
+              <a:t>Changing state -&gt; trigger a component reload</a:t>
             </a:r>
             <a:endParaRPr/>
           </a:p>
@@ -8451,25 +8811,27 @@
               <a:buNone/>
             </a:pPr>
             <a:r>
+              <a:rPr b="1" lang="en"/>
+              <a:t>Do not</a:t>
+            </a:r>
+            <a:r>
               <a:rPr lang="en"/>
-              <a:t>Common Workaround: pass a state-modifying function as prop to child.</a:t>
-            </a:r>
-            <a:endParaRPr/>
-          </a:p>
-          <a:p>
-            <a:pPr indent="-342900" lvl="0" marL="457200" rtl="0" algn="l">
+              <a:t> modify state directly (will not trigger reload). Use React’s state funcs.</a:t>
+            </a:r>
+            <a:endParaRPr/>
+          </a:p>
+          <a:p>
+            <a:pPr indent="0" lvl="0" marL="0" rtl="0" algn="l">
               <a:spcBef>
                 <a:spcPts val="1200"/>
               </a:spcBef>
               <a:spcAft>
                 <a:spcPts val="0"/>
               </a:spcAft>
-              <a:buSzPts val="1800"/>
-              <a:buChar char="-"/>
-            </a:pPr>
-            <a:r>
-              <a:rPr lang="en"/>
-              <a:t>Child can then call the passed function to indirectly modify parent state.</a:t>
+              <a:buNone/>
+            </a:pPr>
+            <a:r>
+              <a:t/>
             </a:r>
             <a:endParaRPr/>
           </a:p>
@@ -8479,52 +8841,12 @@
                 <a:spcPts val="1200"/>
               </a:spcBef>
               <a:spcAft>
-                <a:spcPts val="0"/>
+                <a:spcPts val="1200"/>
               </a:spcAft>
               <a:buNone/>
             </a:pPr>
             <a:r>
               <a:t/>
-            </a:r>
-            <a:endParaRPr/>
-          </a:p>
-          <a:p>
-            <a:pPr indent="0" lvl="0" marL="0" rtl="0" algn="l">
-              <a:spcBef>
-                <a:spcPts val="1200"/>
-              </a:spcBef>
-              <a:spcAft>
-                <a:spcPts val="0"/>
-              </a:spcAft>
-              <a:buNone/>
-            </a:pPr>
-            <a:r>
-              <a:rPr lang="en"/>
-              <a:t>Summary: State flows down (waterfall). Changes can </a:t>
-            </a:r>
-            <a:r>
-              <a:rPr i="1" lang="en"/>
-              <a:t>sometimes</a:t>
-            </a:r>
-            <a:r>
-              <a:rPr lang="en"/>
-              <a:t> flow back up.</a:t>
-            </a:r>
-            <a:endParaRPr/>
-          </a:p>
-          <a:p>
-            <a:pPr indent="0" lvl="0" marL="0" rtl="0" algn="l">
-              <a:spcBef>
-                <a:spcPts val="1200"/>
-              </a:spcBef>
-              <a:spcAft>
-                <a:spcPts val="1200"/>
-              </a:spcAft>
-              <a:buNone/>
-            </a:pPr>
-            <a:r>
-              <a:rPr lang="en"/>
-              <a:t>(We will learn about state management libraries later on)</a:t>
             </a:r>
             <a:endParaRPr/>
           </a:p>
@@ -8589,7 +8911,7 @@
             </a:pPr>
             <a:r>
               <a:rPr lang="en"/>
-              <a:t>React: Design Process</a:t>
+              <a:t>React: Data (States &amp; Props) Flow</a:t>
             </a:r>
             <a:endParaRPr/>
           </a:p>
@@ -8605,7 +8927,7 @@
         </p:nvSpPr>
         <p:spPr>
           <a:xfrm>
-            <a:off x="387900" y="1461749"/>
+            <a:off x="387900" y="1489824"/>
             <a:ext cx="8368200" cy="3078900"/>
           </a:xfrm>
           <a:prstGeom prst="rect">
@@ -8614,7 +8936,7 @@
         </p:spPr>
         <p:txBody>
           <a:bodyPr anchorCtr="0" anchor="t" bIns="91425" lIns="91425" spcFirstLastPara="1" rIns="91425" wrap="square" tIns="91425">
-            <a:normAutofit/>
+            <a:normAutofit lnSpcReduction="20000"/>
           </a:bodyPr>
           <a:lstStyle/>
           <a:p>
@@ -8629,7 +8951,39 @@
             </a:pPr>
             <a:r>
               <a:rPr lang="en"/>
-              <a:t>How to think + code like a React dev:</a:t>
+              <a:t>Parent-Child relationships (think Tree)</a:t>
+            </a:r>
+            <a:endParaRPr/>
+          </a:p>
+          <a:p>
+            <a:pPr indent="0" lvl="0" marL="0" rtl="0" algn="l">
+              <a:spcBef>
+                <a:spcPts val="1200"/>
+              </a:spcBef>
+              <a:spcAft>
+                <a:spcPts val="0"/>
+              </a:spcAft>
+              <a:buNone/>
+            </a:pPr>
+            <a:r>
+              <a:rPr lang="en"/>
+              <a:t>State is always local, but can flow downwards (to children) as props.</a:t>
+            </a:r>
+            <a:endParaRPr/>
+          </a:p>
+          <a:p>
+            <a:pPr indent="0" lvl="0" marL="0" rtl="0" algn="l">
+              <a:spcBef>
+                <a:spcPts val="1200"/>
+              </a:spcBef>
+              <a:spcAft>
+                <a:spcPts val="0"/>
+              </a:spcAft>
+              <a:buNone/>
+            </a:pPr>
+            <a:r>
+              <a:rPr lang="en"/>
+              <a:t>Common Workaround: pass a state-modifying function as prop to child.</a:t>
             </a:r>
             <a:endParaRPr/>
           </a:p>
@@ -8646,92 +9000,62 @@
             </a:pPr>
             <a:r>
               <a:rPr lang="en"/>
-              <a:t>Break UI into component list/hierarchy (form the Tree)</a:t>
-            </a:r>
-            <a:endParaRPr/>
-          </a:p>
-          <a:p>
-            <a:pPr indent="-342900" lvl="0" marL="457200" rtl="0" algn="l">
-              <a:spcBef>
-                <a:spcPts val="0"/>
-              </a:spcBef>
-              <a:spcAft>
-                <a:spcPts val="0"/>
-              </a:spcAft>
-              <a:buSzPts val="1800"/>
-              <a:buChar char="-"/>
+              <a:t>Child can then call the passed function to indirectly modify parent state.</a:t>
+            </a:r>
+            <a:endParaRPr/>
+          </a:p>
+          <a:p>
+            <a:pPr indent="0" lvl="0" marL="0" rtl="0" algn="l">
+              <a:spcBef>
+                <a:spcPts val="1200"/>
+              </a:spcBef>
+              <a:spcAft>
+                <a:spcPts val="0"/>
+              </a:spcAft>
+              <a:buNone/>
+            </a:pPr>
+            <a:r>
+              <a:t/>
+            </a:r>
+            <a:endParaRPr/>
+          </a:p>
+          <a:p>
+            <a:pPr indent="0" lvl="0" marL="0" rtl="0" algn="l">
+              <a:spcBef>
+                <a:spcPts val="1200"/>
+              </a:spcBef>
+              <a:spcAft>
+                <a:spcPts val="0"/>
+              </a:spcAft>
+              <a:buNone/>
             </a:pPr>
             <a:r>
               <a:rPr lang="en"/>
-              <a:t>Build static version of UI first</a:t>
-            </a:r>
-            <a:endParaRPr/>
-          </a:p>
-          <a:p>
-            <a:pPr indent="-317500" lvl="1" marL="914400" rtl="0" algn="l">
-              <a:spcBef>
-                <a:spcPts val="0"/>
-              </a:spcBef>
-              <a:spcAft>
-                <a:spcPts val="0"/>
-              </a:spcAft>
-              <a:buSzPts val="1400"/>
-              <a:buChar char="-"/>
-            </a:pPr>
+              <a:t>Summary: State flows down (waterfall). Changes can </a:t>
+            </a:r>
+            <a:r>
+              <a:rPr i="1" lang="en"/>
+              <a:t>sometimes</a:t>
+            </a:r>
             <a:r>
               <a:rPr lang="en"/>
-              <a:t>Compatible with data models, but no interactions</a:t>
-            </a:r>
-            <a:endParaRPr/>
-          </a:p>
-          <a:p>
-            <a:pPr indent="-342900" lvl="0" marL="457200" rtl="0" algn="l">
-              <a:spcBef>
-                <a:spcPts val="0"/>
-              </a:spcBef>
-              <a:spcAft>
-                <a:spcPts val="0"/>
-              </a:spcAft>
-              <a:buSzPts val="1800"/>
-              <a:buChar char="-"/>
+              <a:t> flow back up.</a:t>
+            </a:r>
+            <a:endParaRPr/>
+          </a:p>
+          <a:p>
+            <a:pPr indent="0" lvl="0" marL="0" rtl="0" algn="l">
+              <a:spcBef>
+                <a:spcPts val="1200"/>
+              </a:spcBef>
+              <a:spcAft>
+                <a:spcPts val="1200"/>
+              </a:spcAft>
+              <a:buNone/>
             </a:pPr>
             <a:r>
               <a:rPr lang="en"/>
-              <a:t>Find simplest representation of UI state for each component</a:t>
-            </a:r>
-            <a:endParaRPr/>
-          </a:p>
-          <a:p>
-            <a:pPr indent="-342900" lvl="0" marL="457200" rtl="0" algn="l">
-              <a:spcBef>
-                <a:spcPts val="0"/>
-              </a:spcBef>
-              <a:spcAft>
-                <a:spcPts val="0"/>
-              </a:spcAft>
-              <a:buSzPts val="1800"/>
-              <a:buChar char="-"/>
-            </a:pPr>
-            <a:r>
-              <a:rPr lang="en"/>
-              <a:t>Identify where state should live</a:t>
-            </a:r>
-            <a:endParaRPr/>
-          </a:p>
-          <a:p>
-            <a:pPr indent="-342900" lvl="0" marL="457200" rtl="0" algn="l">
-              <a:spcBef>
-                <a:spcPts val="0"/>
-              </a:spcBef>
-              <a:spcAft>
-                <a:spcPts val="0"/>
-              </a:spcAft>
-              <a:buSzPts val="1800"/>
-              <a:buChar char="-"/>
-            </a:pPr>
-            <a:r>
-              <a:rPr lang="en"/>
-              <a:t>Add inverse data flow (changes go back up)</a:t>
+              <a:t>(We will learn about state management libraries later on)</a:t>
             </a:r>
             <a:endParaRPr/>
           </a:p>
@@ -8796,7 +9120,7 @@
             </a:pPr>
             <a:r>
               <a:rPr lang="en"/>
-              <a:t>Component Libraries/Frameworks</a:t>
+              <a:t>React: Design Process</a:t>
             </a:r>
             <a:endParaRPr/>
           </a:p>
@@ -8812,8 +9136,8 @@
         </p:nvSpPr>
         <p:spPr>
           <a:xfrm>
-            <a:off x="387900" y="1489825"/>
-            <a:ext cx="8368200" cy="3527400"/>
+            <a:off x="387900" y="1461749"/>
+            <a:ext cx="8368200" cy="3078900"/>
           </a:xfrm>
           <a:prstGeom prst="rect">
             <a:avLst/>
@@ -8821,7 +9145,7 @@
         </p:spPr>
         <p:txBody>
           <a:bodyPr anchorCtr="0" anchor="t" bIns="91425" lIns="91425" spcFirstLastPara="1" rIns="91425" wrap="square" tIns="91425">
-            <a:normAutofit lnSpcReduction="10000"/>
+            <a:normAutofit/>
           </a:bodyPr>
           <a:lstStyle/>
           <a:p>
@@ -8836,55 +9160,7 @@
             </a:pPr>
             <a:r>
               <a:rPr lang="en"/>
-              <a:t>SUPER USEFUL (and fun to explore)</a:t>
-            </a:r>
-            <a:endParaRPr/>
-          </a:p>
-          <a:p>
-            <a:pPr indent="0" lvl="0" marL="0" rtl="0" algn="l">
-              <a:spcBef>
-                <a:spcPts val="1200"/>
-              </a:spcBef>
-              <a:spcAft>
-                <a:spcPts val="0"/>
-              </a:spcAft>
-              <a:buNone/>
-            </a:pPr>
-            <a:r>
-              <a:rPr lang="en"/>
-              <a:t>You no longer have to style everything by hand (b/c CSS bad).</a:t>
-            </a:r>
-            <a:endParaRPr/>
-          </a:p>
-          <a:p>
-            <a:pPr indent="0" lvl="0" marL="0" rtl="0" algn="l">
-              <a:spcBef>
-                <a:spcPts val="1200"/>
-              </a:spcBef>
-              <a:spcAft>
-                <a:spcPts val="0"/>
-              </a:spcAft>
-              <a:buNone/>
-            </a:pPr>
-            <a:r>
-              <a:rPr lang="en"/>
-              <a:t>Find one that you enjoy and read the docs on how to use it!</a:t>
-            </a:r>
-            <a:endParaRPr/>
-          </a:p>
-          <a:p>
-            <a:pPr indent="0" lvl="0" marL="0" rtl="0" algn="l">
-              <a:spcBef>
-                <a:spcPts val="1200"/>
-              </a:spcBef>
-              <a:spcAft>
-                <a:spcPts val="0"/>
-              </a:spcAft>
-              <a:buNone/>
-            </a:pPr>
-            <a:r>
-              <a:rPr lang="en"/>
-              <a:t>Popular ones:</a:t>
+              <a:t>How to think + code like a React dev:</a:t>
             </a:r>
             <a:endParaRPr/>
           </a:p>
@@ -8901,7 +9177,7 @@
             </a:pPr>
             <a:r>
               <a:rPr lang="en"/>
-              <a:t>MaterialUI (google)</a:t>
+              <a:t>Break UI into component list/hierarchy (form the Tree)</a:t>
             </a:r>
             <a:endParaRPr/>
           </a:p>
@@ -8918,7 +9194,24 @@
             </a:pPr>
             <a:r>
               <a:rPr lang="en"/>
-              <a:t>Bootstrap</a:t>
+              <a:t>Build static version of UI first</a:t>
+            </a:r>
+            <a:endParaRPr/>
+          </a:p>
+          <a:p>
+            <a:pPr indent="-317500" lvl="1" marL="914400" rtl="0" algn="l">
+              <a:spcBef>
+                <a:spcPts val="0"/>
+              </a:spcBef>
+              <a:spcAft>
+                <a:spcPts val="0"/>
+              </a:spcAft>
+              <a:buSzPts val="1400"/>
+              <a:buChar char="-"/>
+            </a:pPr>
+            <a:r>
+              <a:rPr lang="en"/>
+              <a:t>Compatible with data models, but no interactions</a:t>
             </a:r>
             <a:endParaRPr/>
           </a:p>
@@ -8935,7 +9228,7 @@
             </a:pPr>
             <a:r>
               <a:rPr lang="en"/>
-              <a:t>Ant Design (Ant Financial, Alibaba)</a:t>
+              <a:t>Find simplest representation of UI state for each component</a:t>
             </a:r>
             <a:endParaRPr/>
           </a:p>
@@ -8952,23 +9245,24 @@
             </a:pPr>
             <a:r>
               <a:rPr lang="en"/>
-              <a:t>Evergreen</a:t>
-            </a:r>
-            <a:endParaRPr/>
-          </a:p>
-          <a:p>
-            <a:pPr indent="0" lvl="0" marL="0" rtl="0" algn="l">
-              <a:spcBef>
-                <a:spcPts val="1200"/>
-              </a:spcBef>
-              <a:spcAft>
-                <a:spcPts val="1200"/>
-              </a:spcAft>
-              <a:buNone/>
+              <a:t>Identify where state should live</a:t>
+            </a:r>
+            <a:endParaRPr/>
+          </a:p>
+          <a:p>
+            <a:pPr indent="-342900" lvl="0" marL="457200" rtl="0" algn="l">
+              <a:spcBef>
+                <a:spcPts val="0"/>
+              </a:spcBef>
+              <a:spcAft>
+                <a:spcPts val="0"/>
+              </a:spcAft>
+              <a:buSzPts val="1800"/>
+              <a:buChar char="-"/>
             </a:pPr>
             <a:r>
               <a:rPr lang="en"/>
-              <a:t>We’re gonna use Geist UI (more obscure, to get used to learning weird things)</a:t>
+              <a:t>Add inverse data flow (changes go back up)</a:t>
             </a:r>
             <a:endParaRPr/>
           </a:p>

</xml_diff>